<commit_message>
ec2-docs: more descriptions about landscape automation procedures
</commit_message>
<xml_diff>
--- a/doc/LandscapeOverview.pptx
+++ b/doc/LandscapeOverview.pptx
@@ -82,7 +82,115 @@
                 </a:solidFill>
                 <a:latin typeface="Arial"/>
               </a:rPr>
-              <a:t>Click to move the slide</a:t>
+              <a:t>Cl</a:t>
+            </a:r>
+            <a:r>
+              <a:rPr b="0" lang="de-DE" sz="2100" spc="-1" strike="noStrike">
+                <a:solidFill>
+                  <a:srgbClr val="ffffff"/>
+                </a:solidFill>
+                <a:latin typeface="Arial"/>
+              </a:rPr>
+              <a:t>ic</a:t>
+            </a:r>
+            <a:r>
+              <a:rPr b="0" lang="de-DE" sz="2100" spc="-1" strike="noStrike">
+                <a:solidFill>
+                  <a:srgbClr val="ffffff"/>
+                </a:solidFill>
+                <a:latin typeface="Arial"/>
+              </a:rPr>
+              <a:t>k </a:t>
+            </a:r>
+            <a:r>
+              <a:rPr b="0" lang="de-DE" sz="2100" spc="-1" strike="noStrike">
+                <a:solidFill>
+                  <a:srgbClr val="ffffff"/>
+                </a:solidFill>
+                <a:latin typeface="Arial"/>
+              </a:rPr>
+              <a:t>to </a:t>
+            </a:r>
+            <a:r>
+              <a:rPr b="0" lang="de-DE" sz="2100" spc="-1" strike="noStrike">
+                <a:solidFill>
+                  <a:srgbClr val="ffffff"/>
+                </a:solidFill>
+                <a:latin typeface="Arial"/>
+              </a:rPr>
+              <a:t>m</a:t>
+            </a:r>
+            <a:r>
+              <a:rPr b="0" lang="de-DE" sz="2100" spc="-1" strike="noStrike">
+                <a:solidFill>
+                  <a:srgbClr val="ffffff"/>
+                </a:solidFill>
+                <a:latin typeface="Arial"/>
+              </a:rPr>
+              <a:t>o</a:t>
+            </a:r>
+            <a:r>
+              <a:rPr b="0" lang="de-DE" sz="2100" spc="-1" strike="noStrike">
+                <a:solidFill>
+                  <a:srgbClr val="ffffff"/>
+                </a:solidFill>
+                <a:latin typeface="Arial"/>
+              </a:rPr>
+              <a:t>v</a:t>
+            </a:r>
+            <a:r>
+              <a:rPr b="0" lang="de-DE" sz="2100" spc="-1" strike="noStrike">
+                <a:solidFill>
+                  <a:srgbClr val="ffffff"/>
+                </a:solidFill>
+                <a:latin typeface="Arial"/>
+              </a:rPr>
+              <a:t>e </a:t>
+            </a:r>
+            <a:r>
+              <a:rPr b="0" lang="de-DE" sz="2100" spc="-1" strike="noStrike">
+                <a:solidFill>
+                  <a:srgbClr val="ffffff"/>
+                </a:solidFill>
+                <a:latin typeface="Arial"/>
+              </a:rPr>
+              <a:t>th</a:t>
+            </a:r>
+            <a:r>
+              <a:rPr b="0" lang="de-DE" sz="2100" spc="-1" strike="noStrike">
+                <a:solidFill>
+                  <a:srgbClr val="ffffff"/>
+                </a:solidFill>
+                <a:latin typeface="Arial"/>
+              </a:rPr>
+              <a:t>e </a:t>
+            </a:r>
+            <a:r>
+              <a:rPr b="0" lang="de-DE" sz="2100" spc="-1" strike="noStrike">
+                <a:solidFill>
+                  <a:srgbClr val="ffffff"/>
+                </a:solidFill>
+                <a:latin typeface="Arial"/>
+              </a:rPr>
+              <a:t>sli</a:t>
+            </a:r>
+            <a:r>
+              <a:rPr b="0" lang="de-DE" sz="2100" spc="-1" strike="noStrike">
+                <a:solidFill>
+                  <a:srgbClr val="ffffff"/>
+                </a:solidFill>
+                <a:latin typeface="Arial"/>
+              </a:rPr>
+              <a:t>d</a:t>
+            </a:r>
+            <a:r>
+              <a:rPr b="0" lang="de-DE" sz="2100" spc="-1" strike="noStrike">
+                <a:solidFill>
+                  <a:srgbClr val="ffffff"/>
+                </a:solidFill>
+                <a:latin typeface="Arial"/>
+              </a:rPr>
+              <a:t>e</a:t>
             </a:r>
             <a:endParaRPr b="0" lang="de-DE" sz="2100" spc="-1" strike="noStrike">
               <a:solidFill>
@@ -121,7 +229,31 @@
               <a:rPr b="0" lang="en-US" sz="2000" spc="-1" strike="noStrike">
                 <a:latin typeface="Arial"/>
               </a:rPr>
-              <a:t>Click to edit the notes format</a:t>
+              <a:t>Click to </a:t>
+            </a:r>
+            <a:r>
+              <a:rPr b="0" lang="en-US" sz="2000" spc="-1" strike="noStrike">
+                <a:latin typeface="Arial"/>
+              </a:rPr>
+              <a:t>edit </a:t>
+            </a:r>
+            <a:r>
+              <a:rPr b="0" lang="en-US" sz="2000" spc="-1" strike="noStrike">
+                <a:latin typeface="Arial"/>
+              </a:rPr>
+              <a:t>the </a:t>
+            </a:r>
+            <a:r>
+              <a:rPr b="0" lang="en-US" sz="2000" spc="-1" strike="noStrike">
+                <a:latin typeface="Arial"/>
+              </a:rPr>
+              <a:t>notes </a:t>
+            </a:r>
+            <a:r>
+              <a:rPr b="0" lang="en-US" sz="2000" spc="-1" strike="noStrike">
+                <a:latin typeface="Arial"/>
+              </a:rPr>
+              <a:t>format</a:t>
             </a:r>
             <a:endParaRPr b="0" lang="en-US" sz="2000" spc="-1" strike="noStrike">
               <a:latin typeface="Arial"/>
@@ -263,7 +395,7 @@
           </a:bodyPr>
           <a:p>
             <a:pPr algn="r"/>
-            <a:fld id="{8E170983-7CBB-4044-9DE4-6496560A474C}" type="slidenum">
+            <a:fld id="{7FF55315-B985-4C22-86D8-8221C77A9D79}" type="slidenum">
               <a:rPr b="0" lang="en-US" sz="1400" spc="-1" strike="noStrike">
                 <a:latin typeface="Times New Roman"/>
               </a:rPr>
@@ -377,7 +509,7 @@
                 <a:spcPct val="100000"/>
               </a:lnSpc>
             </a:pPr>
-            <a:fld id="{8530B89E-FCFC-4B9C-9972-AD2CEEE4673E}" type="slidenum">
+            <a:fld id="{8F649087-D10E-47F6-BEDA-8341B386289A}" type="slidenum">
               <a:rPr b="0" lang="de-DE" sz="800" spc="-1" strike="noStrike">
                 <a:solidFill>
                   <a:srgbClr val="000000"/>
@@ -385,7 +517,7 @@
                 <a:latin typeface="Arial"/>
                 <a:ea typeface="+mn-ea"/>
               </a:rPr>
-              <a:t>&lt;number&gt;</a:t>
+              <a:t>8</a:t>
             </a:fld>
             <a:endParaRPr b="0" lang="en-US" sz="800" spc="-1" strike="noStrike">
               <a:latin typeface="Times New Roman"/>
@@ -444,7 +576,7 @@
                 <a:spcPct val="100000"/>
               </a:lnSpc>
             </a:pPr>
-            <a:fld id="{084F4152-AEFD-4C3A-B8FE-44F3BDFEB0D7}" type="slidenum">
+            <a:fld id="{20C379E2-B5FE-45D1-A422-02CE9C5ABD71}" type="slidenum">
               <a:rPr b="0" lang="de-DE" sz="800" spc="-1" strike="noStrike">
                 <a:solidFill>
                   <a:srgbClr val="000000"/>
@@ -452,7 +584,7 @@
                 <a:latin typeface="Arial"/>
                 <a:ea typeface="+mn-ea"/>
               </a:rPr>
-              <a:t>&lt;number&gt;</a:t>
+              <a:t>8</a:t>
             </a:fld>
             <a:endParaRPr b="0" lang="en-US" sz="800" spc="-1" strike="noStrike">
               <a:latin typeface="Times New Roman"/>
@@ -10713,7 +10845,7 @@
                 <a:tab algn="l" pos="0"/>
               </a:tabLst>
             </a:pPr>
-            <a:fld id="{37A36B27-F236-40F1-A82D-70CEBD36645B}" type="slidenum">
+            <a:fld id="{6EE734E6-17B2-46AB-9C47-209442A5619B}" type="slidenum">
               <a:rPr b="0" lang="en-US" sz="900" spc="-1" strike="noStrike">
                 <a:solidFill>
                   <a:srgbClr val="ffffff"/>
@@ -10959,7 +11091,7 @@
                 </a:solidFill>
                 <a:latin typeface="Arial"/>
               </a:rPr>
-              <a:t>P</a:t>
+              <a:t>Pre</a:t>
             </a:r>
             <a:r>
               <a:rPr b="1" lang="en-US" sz="3600" spc="-1" strike="noStrike">
@@ -10968,7 +11100,7 @@
                 </a:solidFill>
                 <a:latin typeface="Arial"/>
               </a:rPr>
-              <a:t>re</a:t>
+              <a:t>sen</a:t>
             </a:r>
             <a:r>
               <a:rPr b="1" lang="en-US" sz="3600" spc="-1" strike="noStrike">
@@ -10977,7 +11109,7 @@
                 </a:solidFill>
                 <a:latin typeface="Arial"/>
               </a:rPr>
-              <a:t>s</a:t>
+              <a:t>tati</a:t>
             </a:r>
             <a:r>
               <a:rPr b="1" lang="en-US" sz="3600" spc="-1" strike="noStrike">
@@ -10986,7 +11118,7 @@
                 </a:solidFill>
                 <a:latin typeface="Arial"/>
               </a:rPr>
-              <a:t>e</a:t>
+              <a:t>on </a:t>
             </a:r>
             <a:r>
               <a:rPr b="1" lang="en-US" sz="3600" spc="-1" strike="noStrike">
@@ -10995,7 +11127,7 @@
                 </a:solidFill>
                 <a:latin typeface="Arial"/>
               </a:rPr>
-              <a:t>nt</a:t>
+              <a:t>Titl</a:t>
             </a:r>
             <a:r>
               <a:rPr b="1" lang="en-US" sz="3600" spc="-1" strike="noStrike">
@@ -11004,8 +11136,9 @@
                 </a:solidFill>
                 <a:latin typeface="Arial"/>
               </a:rPr>
-              <a:t>at</a:t>
-            </a:r>
+              <a:t>e </a:t>
+            </a:r>
+            <a:br/>
             <a:r>
               <a:rPr b="1" lang="en-US" sz="3600" spc="-1" strike="noStrike">
                 <a:solidFill>
@@ -11013,7 +11146,7 @@
                 </a:solidFill>
                 <a:latin typeface="Arial"/>
               </a:rPr>
-              <a:t>io</a:t>
+              <a:t>Goe</a:t>
             </a:r>
             <a:r>
               <a:rPr b="1" lang="en-US" sz="3600" spc="-1" strike="noStrike">
@@ -11022,7 +11155,7 @@
                 </a:solidFill>
                 <a:latin typeface="Arial"/>
               </a:rPr>
-              <a:t>n </a:t>
+              <a:t>s </a:t>
             </a:r>
             <a:r>
               <a:rPr b="1" lang="en-US" sz="3600" spc="-1" strike="noStrike">
@@ -11031,7 +11164,7 @@
                 </a:solidFill>
                 <a:latin typeface="Arial"/>
               </a:rPr>
-              <a:t>Ti</a:t>
+              <a:t>Her</a:t>
             </a:r>
             <a:r>
               <a:rPr b="1" lang="en-US" sz="3600" spc="-1" strike="noStrike">
@@ -11040,7 +11173,7 @@
                 </a:solidFill>
                 <a:latin typeface="Arial"/>
               </a:rPr>
-              <a:t>tl</a:t>
+              <a:t>e </a:t>
             </a:r>
             <a:r>
               <a:rPr b="1" lang="en-US" sz="3600" spc="-1" strike="noStrike">
@@ -11049,9 +11182,8 @@
                 </a:solidFill>
                 <a:latin typeface="Arial"/>
               </a:rPr>
-              <a:t>e </a:t>
-            </a:r>
-            <a:br/>
+              <a:t>and </a:t>
+            </a:r>
             <a:r>
               <a:rPr b="1" lang="en-US" sz="3600" spc="-1" strike="noStrike">
                 <a:solidFill>
@@ -11059,106 +11191,7 @@
                 </a:solidFill>
                 <a:latin typeface="Arial"/>
               </a:rPr>
-              <a:t>G</a:t>
-            </a:r>
-            <a:r>
-              <a:rPr b="1" lang="en-US" sz="3600" spc="-1" strike="noStrike">
-                <a:solidFill>
-                  <a:srgbClr val="ffffff"/>
-                </a:solidFill>
-                <a:latin typeface="Arial"/>
-              </a:rPr>
-              <a:t>o</a:t>
-            </a:r>
-            <a:r>
-              <a:rPr b="1" lang="en-US" sz="3600" spc="-1" strike="noStrike">
-                <a:solidFill>
-                  <a:srgbClr val="ffffff"/>
-                </a:solidFill>
-                <a:latin typeface="Arial"/>
-              </a:rPr>
-              <a:t>e</a:t>
-            </a:r>
-            <a:r>
-              <a:rPr b="1" lang="en-US" sz="3600" spc="-1" strike="noStrike">
-                <a:solidFill>
-                  <a:srgbClr val="ffffff"/>
-                </a:solidFill>
-                <a:latin typeface="Arial"/>
-              </a:rPr>
-              <a:t>s </a:t>
-            </a:r>
-            <a:r>
-              <a:rPr b="1" lang="en-US" sz="3600" spc="-1" strike="noStrike">
-                <a:solidFill>
-                  <a:srgbClr val="ffffff"/>
-                </a:solidFill>
-                <a:latin typeface="Arial"/>
-              </a:rPr>
-              <a:t>H</a:t>
-            </a:r>
-            <a:r>
-              <a:rPr b="1" lang="en-US" sz="3600" spc="-1" strike="noStrike">
-                <a:solidFill>
-                  <a:srgbClr val="ffffff"/>
-                </a:solidFill>
-                <a:latin typeface="Arial"/>
-              </a:rPr>
-              <a:t>er</a:t>
-            </a:r>
-            <a:r>
-              <a:rPr b="1" lang="en-US" sz="3600" spc="-1" strike="noStrike">
-                <a:solidFill>
-                  <a:srgbClr val="ffffff"/>
-                </a:solidFill>
-                <a:latin typeface="Arial"/>
-              </a:rPr>
-              <a:t>e </a:t>
-            </a:r>
-            <a:r>
-              <a:rPr b="1" lang="en-US" sz="3600" spc="-1" strike="noStrike">
-                <a:solidFill>
-                  <a:srgbClr val="ffffff"/>
-                </a:solidFill>
-                <a:latin typeface="Arial"/>
-              </a:rPr>
-              <a:t>a</a:t>
-            </a:r>
-            <a:r>
-              <a:rPr b="1" lang="en-US" sz="3600" spc="-1" strike="noStrike">
-                <a:solidFill>
-                  <a:srgbClr val="ffffff"/>
-                </a:solidFill>
-                <a:latin typeface="Arial"/>
-              </a:rPr>
-              <a:t>n</a:t>
-            </a:r>
-            <a:r>
-              <a:rPr b="1" lang="en-US" sz="3600" spc="-1" strike="noStrike">
-                <a:solidFill>
-                  <a:srgbClr val="ffffff"/>
-                </a:solidFill>
-                <a:latin typeface="Arial"/>
-              </a:rPr>
-              <a:t>d </a:t>
-            </a:r>
-            <a:r>
-              <a:rPr b="1" lang="en-US" sz="3600" spc="-1" strike="noStrike">
-                <a:solidFill>
-                  <a:srgbClr val="ffffff"/>
-                </a:solidFill>
-                <a:latin typeface="Arial"/>
-              </a:rPr>
-              <a:t>H</a:t>
-            </a:r>
-            <a:r>
-              <a:rPr b="1" lang="en-US" sz="3600" spc="-1" strike="noStrike">
-                <a:solidFill>
-                  <a:srgbClr val="ffffff"/>
-                </a:solidFill>
-                <a:latin typeface="Arial"/>
-              </a:rPr>
-              <a:t>er</a:t>
+              <a:t>Her</a:t>
             </a:r>
             <a:r>
               <a:rPr b="1" lang="en-US" sz="3600" spc="-1" strike="noStrike">
@@ -11307,7 +11340,7 @@
                 <a:tab algn="l" pos="0"/>
               </a:tabLst>
             </a:pPr>
-            <a:fld id="{03C36B39-1311-4463-8D53-6CCD2E0A7CEA}" type="slidenum">
+            <a:fld id="{E9D211DD-5450-4B6F-B22A-CF65C6C67758}" type="slidenum">
               <a:rPr b="0" lang="en-US" sz="900" spc="-1" strike="noStrike">
                 <a:solidFill>
                   <a:srgbClr val="ffffff"/>
@@ -11563,16 +11596,7 @@
                 </a:solidFill>
                 <a:latin typeface="Arial"/>
               </a:rPr>
-              <a:t>Ag</a:t>
-            </a:r>
-            <a:r>
-              <a:rPr b="1" lang="en-US" sz="2400" spc="-1" strike="noStrike">
-                <a:solidFill>
-                  <a:srgbClr val="ffffff"/>
-                </a:solidFill>
-                <a:latin typeface="Arial"/>
-              </a:rPr>
-              <a:t>en</a:t>
+              <a:t>Agen</a:t>
             </a:r>
             <a:r>
               <a:rPr b="1" lang="en-US" sz="2400" spc="-1" strike="noStrike">
@@ -11674,7 +11698,7 @@
                 <a:tab algn="l" pos="0"/>
               </a:tabLst>
             </a:pPr>
-            <a:fld id="{4FBB012E-CDF9-4DFF-9D1F-1DC2C411FDA2}" type="slidenum">
+            <a:fld id="{C1E35A5D-28EA-4510-B59F-9E8037C6CEF9}" type="slidenum">
               <a:rPr b="0" lang="en-US" sz="900" spc="-1" strike="noStrike">
                 <a:solidFill>
                   <a:srgbClr val="ffffff"/>
@@ -12030,7 +12054,7 @@
                 </a:solidFill>
                 <a:latin typeface="Arial"/>
               </a:rPr>
-              <a:t>Inser</a:t>
+              <a:t>I</a:t>
             </a:r>
             <a:r>
               <a:rPr b="1" lang="en-US" sz="2400" spc="-1" strike="noStrike">
@@ -12039,6 +12063,42 @@
                 </a:solidFill>
                 <a:latin typeface="Arial"/>
               </a:rPr>
+              <a:t>n</a:t>
+            </a:r>
+            <a:r>
+              <a:rPr b="1" lang="en-US" sz="2400" spc="-1" strike="noStrike">
+                <a:solidFill>
+                  <a:srgbClr val="ffffff"/>
+                </a:solidFill>
+                <a:latin typeface="Arial"/>
+              </a:rPr>
+              <a:t>s</a:t>
+            </a:r>
+            <a:r>
+              <a:rPr b="1" lang="en-US" sz="2400" spc="-1" strike="noStrike">
+                <a:solidFill>
+                  <a:srgbClr val="ffffff"/>
+                </a:solidFill>
+                <a:latin typeface="Arial"/>
+              </a:rPr>
+              <a:t>e</a:t>
+            </a:r>
+            <a:r>
+              <a:rPr b="1" lang="en-US" sz="2400" spc="-1" strike="noStrike">
+                <a:solidFill>
+                  <a:srgbClr val="ffffff"/>
+                </a:solidFill>
+                <a:latin typeface="Arial"/>
+              </a:rPr>
+              <a:t>r</a:t>
+            </a:r>
+            <a:r>
+              <a:rPr b="1" lang="en-US" sz="2400" spc="-1" strike="noStrike">
+                <a:solidFill>
+                  <a:srgbClr val="ffffff"/>
+                </a:solidFill>
+                <a:latin typeface="Arial"/>
+              </a:rPr>
               <a:t>t </a:t>
             </a:r>
             <a:r>
@@ -12048,7 +12108,7 @@
                 </a:solidFill>
                 <a:latin typeface="Arial"/>
               </a:rPr>
-              <a:t>page </a:t>
+              <a:t>p</a:t>
             </a:r>
             <a:r>
               <a:rPr b="1" lang="en-US" sz="2400" spc="-1" strike="noStrike">
@@ -12057,7 +12117,7 @@
                 </a:solidFill>
                 <a:latin typeface="Arial"/>
               </a:rPr>
-              <a:t>title </a:t>
+              <a:t>a</a:t>
             </a:r>
             <a:r>
               <a:rPr b="1" lang="en-US" sz="2400" spc="-1" strike="noStrike">
@@ -12066,7 +12126,7 @@
                 </a:solidFill>
                 <a:latin typeface="Arial"/>
               </a:rPr>
-              <a:t>(sent</a:t>
+              <a:t>g</a:t>
             </a:r>
             <a:r>
               <a:rPr b="1" lang="en-US" sz="2400" spc="-1" strike="noStrike">
@@ -12075,7 +12135,7 @@
                 </a:solidFill>
                 <a:latin typeface="Arial"/>
               </a:rPr>
-              <a:t>ence </a:t>
+              <a:t>e </a:t>
             </a:r>
             <a:r>
               <a:rPr b="1" lang="en-US" sz="2400" spc="-1" strike="noStrike">
@@ -12084,7 +12144,142 @@
                 </a:solidFill>
                 <a:latin typeface="Arial"/>
               </a:rPr>
-              <a:t>case</a:t>
+              <a:t>ti</a:t>
+            </a:r>
+            <a:r>
+              <a:rPr b="1" lang="en-US" sz="2400" spc="-1" strike="noStrike">
+                <a:solidFill>
+                  <a:srgbClr val="ffffff"/>
+                </a:solidFill>
+                <a:latin typeface="Arial"/>
+              </a:rPr>
+              <a:t>tl</a:t>
+            </a:r>
+            <a:r>
+              <a:rPr b="1" lang="en-US" sz="2400" spc="-1" strike="noStrike">
+                <a:solidFill>
+                  <a:srgbClr val="ffffff"/>
+                </a:solidFill>
+                <a:latin typeface="Arial"/>
+              </a:rPr>
+              <a:t>e </a:t>
+            </a:r>
+            <a:r>
+              <a:rPr b="1" lang="en-US" sz="2400" spc="-1" strike="noStrike">
+                <a:solidFill>
+                  <a:srgbClr val="ffffff"/>
+                </a:solidFill>
+                <a:latin typeface="Arial"/>
+              </a:rPr>
+              <a:t>(</a:t>
+            </a:r>
+            <a:r>
+              <a:rPr b="1" lang="en-US" sz="2400" spc="-1" strike="noStrike">
+                <a:solidFill>
+                  <a:srgbClr val="ffffff"/>
+                </a:solidFill>
+                <a:latin typeface="Arial"/>
+              </a:rPr>
+              <a:t>s</a:t>
+            </a:r>
+            <a:r>
+              <a:rPr b="1" lang="en-US" sz="2400" spc="-1" strike="noStrike">
+                <a:solidFill>
+                  <a:srgbClr val="ffffff"/>
+                </a:solidFill>
+                <a:latin typeface="Arial"/>
+              </a:rPr>
+              <a:t>e</a:t>
+            </a:r>
+            <a:r>
+              <a:rPr b="1" lang="en-US" sz="2400" spc="-1" strike="noStrike">
+                <a:solidFill>
+                  <a:srgbClr val="ffffff"/>
+                </a:solidFill>
+                <a:latin typeface="Arial"/>
+              </a:rPr>
+              <a:t>n</a:t>
+            </a:r>
+            <a:r>
+              <a:rPr b="1" lang="en-US" sz="2400" spc="-1" strike="noStrike">
+                <a:solidFill>
+                  <a:srgbClr val="ffffff"/>
+                </a:solidFill>
+                <a:latin typeface="Arial"/>
+              </a:rPr>
+              <a:t>t</a:t>
+            </a:r>
+            <a:r>
+              <a:rPr b="1" lang="en-US" sz="2400" spc="-1" strike="noStrike">
+                <a:solidFill>
+                  <a:srgbClr val="ffffff"/>
+                </a:solidFill>
+                <a:latin typeface="Arial"/>
+              </a:rPr>
+              <a:t>e</a:t>
+            </a:r>
+            <a:r>
+              <a:rPr b="1" lang="en-US" sz="2400" spc="-1" strike="noStrike">
+                <a:solidFill>
+                  <a:srgbClr val="ffffff"/>
+                </a:solidFill>
+                <a:latin typeface="Arial"/>
+              </a:rPr>
+              <a:t>n</a:t>
+            </a:r>
+            <a:r>
+              <a:rPr b="1" lang="en-US" sz="2400" spc="-1" strike="noStrike">
+                <a:solidFill>
+                  <a:srgbClr val="ffffff"/>
+                </a:solidFill>
+                <a:latin typeface="Arial"/>
+              </a:rPr>
+              <a:t>c</a:t>
+            </a:r>
+            <a:r>
+              <a:rPr b="1" lang="en-US" sz="2400" spc="-1" strike="noStrike">
+                <a:solidFill>
+                  <a:srgbClr val="ffffff"/>
+                </a:solidFill>
+                <a:latin typeface="Arial"/>
+              </a:rPr>
+              <a:t>e </a:t>
+            </a:r>
+            <a:r>
+              <a:rPr b="1" lang="en-US" sz="2400" spc="-1" strike="noStrike">
+                <a:solidFill>
+                  <a:srgbClr val="ffffff"/>
+                </a:solidFill>
+                <a:latin typeface="Arial"/>
+              </a:rPr>
+              <a:t>c</a:t>
+            </a:r>
+            <a:r>
+              <a:rPr b="1" lang="en-US" sz="2400" spc="-1" strike="noStrike">
+                <a:solidFill>
+                  <a:srgbClr val="ffffff"/>
+                </a:solidFill>
+                <a:latin typeface="Arial"/>
+              </a:rPr>
+              <a:t>a</a:t>
+            </a:r>
+            <a:r>
+              <a:rPr b="1" lang="en-US" sz="2400" spc="-1" strike="noStrike">
+                <a:solidFill>
+                  <a:srgbClr val="ffffff"/>
+                </a:solidFill>
+                <a:latin typeface="Arial"/>
+              </a:rPr>
+              <a:t>s</a:t>
+            </a:r>
+            <a:r>
+              <a:rPr b="1" lang="en-US" sz="2400" spc="-1" strike="noStrike">
+                <a:solidFill>
+                  <a:srgbClr val="ffffff"/>
+                </a:solidFill>
+                <a:latin typeface="Arial"/>
+              </a:rPr>
+              <a:t>e</a:t>
             </a:r>
             <a:r>
               <a:rPr b="1" lang="en-US" sz="2400" spc="-1" strike="noStrike">
@@ -12186,7 +12381,7 @@
                 <a:tab algn="l" pos="0"/>
               </a:tabLst>
             </a:pPr>
-            <a:fld id="{3ED63538-A156-4126-A2EA-514E8A9AF2B7}" type="slidenum">
+            <a:fld id="{7071FEED-2CB8-41F0-9014-8264E31BCBFE}" type="slidenum">
               <a:rPr b="0" lang="en-US" sz="900" spc="-1" strike="noStrike">
                 <a:solidFill>
                   <a:srgbClr val="ffffff"/>
@@ -12409,7 +12604,7 @@
                 </a:solidFill>
                 <a:latin typeface="Arial"/>
               </a:rPr>
-              <a:t>Di</a:t>
+              <a:t>D</a:t>
             </a:r>
             <a:r>
               <a:rPr b="1" lang="en-US" sz="4400" spc="-1" strike="noStrike">
@@ -12418,7 +12613,7 @@
                 </a:solidFill>
                 <a:latin typeface="Arial"/>
               </a:rPr>
-              <a:t>vi</a:t>
+              <a:t>i</a:t>
             </a:r>
             <a:r>
               <a:rPr b="1" lang="en-US" sz="4400" spc="-1" strike="noStrike">
@@ -12427,7 +12622,7 @@
                 </a:solidFill>
                 <a:latin typeface="Arial"/>
               </a:rPr>
-              <a:t>de</a:t>
+              <a:t>v</a:t>
             </a:r>
             <a:r>
               <a:rPr b="1" lang="en-US" sz="4400" spc="-1" strike="noStrike">
@@ -12436,7 +12631,7 @@
                 </a:solidFill>
                 <a:latin typeface="Arial"/>
               </a:rPr>
-              <a:t>r </a:t>
+              <a:t>i</a:t>
             </a:r>
             <a:r>
               <a:rPr b="1" lang="en-US" sz="4400" spc="-1" strike="noStrike">
@@ -12445,7 +12640,7 @@
                 </a:solidFill>
                 <a:latin typeface="Arial"/>
               </a:rPr>
-              <a:t>pa</a:t>
+              <a:t>d</a:t>
             </a:r>
             <a:r>
               <a:rPr b="1" lang="en-US" sz="4400" spc="-1" strike="noStrike">
@@ -12454,7 +12649,61 @@
                 </a:solidFill>
                 <a:latin typeface="Arial"/>
               </a:rPr>
-              <a:t>ge</a:t>
+              <a:t>e</a:t>
+            </a:r>
+            <a:r>
+              <a:rPr b="1" lang="en-US" sz="4400" spc="-1" strike="noStrike">
+                <a:solidFill>
+                  <a:srgbClr val="ffffff"/>
+                </a:solidFill>
+                <a:latin typeface="Arial"/>
+              </a:rPr>
+              <a:t>r</a:t>
+            </a:r>
+            <a:r>
+              <a:rPr b="1" lang="en-US" sz="4400" spc="-1" strike="noStrike">
+                <a:solidFill>
+                  <a:srgbClr val="ffffff"/>
+                </a:solidFill>
+                <a:latin typeface="Arial"/>
+              </a:rPr>
+              <a:t> </a:t>
+            </a:r>
+            <a:r>
+              <a:rPr b="1" lang="en-US" sz="4400" spc="-1" strike="noStrike">
+                <a:solidFill>
+                  <a:srgbClr val="ffffff"/>
+                </a:solidFill>
+                <a:latin typeface="Arial"/>
+              </a:rPr>
+              <a:t>p</a:t>
+            </a:r>
+            <a:r>
+              <a:rPr b="1" lang="en-US" sz="4400" spc="-1" strike="noStrike">
+                <a:solidFill>
+                  <a:srgbClr val="ffffff"/>
+                </a:solidFill>
+                <a:latin typeface="Arial"/>
+              </a:rPr>
+              <a:t>a</a:t>
+            </a:r>
+            <a:r>
+              <a:rPr b="1" lang="en-US" sz="4400" spc="-1" strike="noStrike">
+                <a:solidFill>
+                  <a:srgbClr val="ffffff"/>
+                </a:solidFill>
+                <a:latin typeface="Arial"/>
+              </a:rPr>
+              <a:t>g</a:t>
+            </a:r>
+            <a:r>
+              <a:rPr b="1" lang="en-US" sz="4400" spc="-1" strike="noStrike">
+                <a:solidFill>
+                  <a:srgbClr val="ffffff"/>
+                </a:solidFill>
+                <a:latin typeface="Arial"/>
+              </a:rPr>
+              <a:t>e</a:t>
             </a:r>
             <a:endParaRPr b="0" lang="de-DE" sz="4400" spc="-1" strike="noStrike">
               <a:solidFill>
@@ -12547,7 +12796,7 @@
                 <a:tab algn="l" pos="0"/>
               </a:tabLst>
             </a:pPr>
-            <a:fld id="{4953B572-110D-409E-94D4-AE795062797D}" type="slidenum">
+            <a:fld id="{BC004EE5-6AA2-49B5-923C-03545230BCF6}" type="slidenum">
               <a:rPr b="0" lang="en-US" sz="900" spc="-1" strike="noStrike">
                 <a:solidFill>
                   <a:srgbClr val="ffffff"/>
@@ -13209,7 +13458,7 @@
                 </a:solidFill>
                 <a:latin typeface="Arial"/>
               </a:rPr>
-              <a:t>Clic</a:t>
+              <a:t>C</a:t>
             </a:r>
             <a:r>
               <a:rPr b="0" lang="de-DE" sz="2100" spc="-1" strike="noStrike">
@@ -13218,7 +13467,7 @@
                 </a:solidFill>
                 <a:latin typeface="Arial"/>
               </a:rPr>
-              <a:t>k to </a:t>
+              <a:t>li</a:t>
             </a:r>
             <a:r>
               <a:rPr b="0" lang="de-DE" sz="2100" spc="-1" strike="noStrike">
@@ -13227,7 +13476,7 @@
                 </a:solidFill>
                 <a:latin typeface="Arial"/>
               </a:rPr>
-              <a:t>edit </a:t>
+              <a:t>c</a:t>
             </a:r>
             <a:r>
               <a:rPr b="0" lang="de-DE" sz="2100" spc="-1" strike="noStrike">
@@ -13236,7 +13485,7 @@
                 </a:solidFill>
                 <a:latin typeface="Arial"/>
               </a:rPr>
-              <a:t>the </a:t>
+              <a:t>k </a:t>
             </a:r>
             <a:r>
               <a:rPr b="0" lang="de-DE" sz="2100" spc="-1" strike="noStrike">
@@ -13245,7 +13494,7 @@
                 </a:solidFill>
                 <a:latin typeface="Arial"/>
               </a:rPr>
-              <a:t>title </a:t>
+              <a:t>t</a:t>
             </a:r>
             <a:r>
               <a:rPr b="0" lang="de-DE" sz="2100" spc="-1" strike="noStrike">
@@ -13254,7 +13503,7 @@
                 </a:solidFill>
                 <a:latin typeface="Arial"/>
               </a:rPr>
-              <a:t>text </a:t>
+              <a:t>o </a:t>
             </a:r>
             <a:r>
               <a:rPr b="0" lang="de-DE" sz="2100" spc="-1" strike="noStrike">
@@ -13263,7 +13512,7 @@
                 </a:solidFill>
                 <a:latin typeface="Arial"/>
               </a:rPr>
-              <a:t>for</a:t>
+              <a:t>e</a:t>
             </a:r>
             <a:r>
               <a:rPr b="0" lang="de-DE" sz="2100" spc="-1" strike="noStrike">
@@ -13272,7 +13521,142 @@
                 </a:solidFill>
                 <a:latin typeface="Arial"/>
               </a:rPr>
-              <a:t>mat</a:t>
+              <a:t>di</a:t>
+            </a:r>
+            <a:r>
+              <a:rPr b="0" lang="de-DE" sz="2100" spc="-1" strike="noStrike">
+                <a:solidFill>
+                  <a:srgbClr val="ffffff"/>
+                </a:solidFill>
+                <a:latin typeface="Arial"/>
+              </a:rPr>
+              <a:t>t </a:t>
+            </a:r>
+            <a:r>
+              <a:rPr b="0" lang="de-DE" sz="2100" spc="-1" strike="noStrike">
+                <a:solidFill>
+                  <a:srgbClr val="ffffff"/>
+                </a:solidFill>
+                <a:latin typeface="Arial"/>
+              </a:rPr>
+              <a:t>t</a:t>
+            </a:r>
+            <a:r>
+              <a:rPr b="0" lang="de-DE" sz="2100" spc="-1" strike="noStrike">
+                <a:solidFill>
+                  <a:srgbClr val="ffffff"/>
+                </a:solidFill>
+                <a:latin typeface="Arial"/>
+              </a:rPr>
+              <a:t>h</a:t>
+            </a:r>
+            <a:r>
+              <a:rPr b="0" lang="de-DE" sz="2100" spc="-1" strike="noStrike">
+                <a:solidFill>
+                  <a:srgbClr val="ffffff"/>
+                </a:solidFill>
+                <a:latin typeface="Arial"/>
+              </a:rPr>
+              <a:t>e </a:t>
+            </a:r>
+            <a:r>
+              <a:rPr b="0" lang="de-DE" sz="2100" spc="-1" strike="noStrike">
+                <a:solidFill>
+                  <a:srgbClr val="ffffff"/>
+                </a:solidFill>
+                <a:latin typeface="Arial"/>
+              </a:rPr>
+              <a:t>tit</a:t>
+            </a:r>
+            <a:r>
+              <a:rPr b="0" lang="de-DE" sz="2100" spc="-1" strike="noStrike">
+                <a:solidFill>
+                  <a:srgbClr val="ffffff"/>
+                </a:solidFill>
+                <a:latin typeface="Arial"/>
+              </a:rPr>
+              <a:t>le </a:t>
+            </a:r>
+            <a:r>
+              <a:rPr b="0" lang="de-DE" sz="2100" spc="-1" strike="noStrike">
+                <a:solidFill>
+                  <a:srgbClr val="ffffff"/>
+                </a:solidFill>
+                <a:latin typeface="Arial"/>
+              </a:rPr>
+              <a:t>t</a:t>
+            </a:r>
+            <a:r>
+              <a:rPr b="0" lang="de-DE" sz="2100" spc="-1" strike="noStrike">
+                <a:solidFill>
+                  <a:srgbClr val="ffffff"/>
+                </a:solidFill>
+                <a:latin typeface="Arial"/>
+              </a:rPr>
+              <a:t>e</a:t>
+            </a:r>
+            <a:r>
+              <a:rPr b="0" lang="de-DE" sz="2100" spc="-1" strike="noStrike">
+                <a:solidFill>
+                  <a:srgbClr val="ffffff"/>
+                </a:solidFill>
+                <a:latin typeface="Arial"/>
+              </a:rPr>
+              <a:t>xt </a:t>
+            </a:r>
+            <a:r>
+              <a:rPr b="0" lang="de-DE" sz="2100" spc="-1" strike="noStrike">
+                <a:solidFill>
+                  <a:srgbClr val="ffffff"/>
+                </a:solidFill>
+                <a:latin typeface="Arial"/>
+              </a:rPr>
+              <a:t>f</a:t>
+            </a:r>
+            <a:r>
+              <a:rPr b="0" lang="de-DE" sz="2100" spc="-1" strike="noStrike">
+                <a:solidFill>
+                  <a:srgbClr val="ffffff"/>
+                </a:solidFill>
+                <a:latin typeface="Arial"/>
+              </a:rPr>
+              <a:t>o</a:t>
+            </a:r>
+            <a:r>
+              <a:rPr b="0" lang="de-DE" sz="2100" spc="-1" strike="noStrike">
+                <a:solidFill>
+                  <a:srgbClr val="ffffff"/>
+                </a:solidFill>
+                <a:latin typeface="Arial"/>
+              </a:rPr>
+              <a:t>r</a:t>
+            </a:r>
+            <a:r>
+              <a:rPr b="0" lang="de-DE" sz="2100" spc="-1" strike="noStrike">
+                <a:solidFill>
+                  <a:srgbClr val="ffffff"/>
+                </a:solidFill>
+                <a:latin typeface="Arial"/>
+              </a:rPr>
+              <a:t>m</a:t>
+            </a:r>
+            <a:r>
+              <a:rPr b="0" lang="de-DE" sz="2100" spc="-1" strike="noStrike">
+                <a:solidFill>
+                  <a:srgbClr val="ffffff"/>
+                </a:solidFill>
+                <a:latin typeface="Arial"/>
+              </a:rPr>
+              <a:t>a</a:t>
+            </a:r>
+            <a:r>
+              <a:rPr b="0" lang="de-DE" sz="2100" spc="-1" strike="noStrike">
+                <a:solidFill>
+                  <a:srgbClr val="ffffff"/>
+                </a:solidFill>
+                <a:latin typeface="Arial"/>
+              </a:rPr>
+              <a:t>t</a:t>
             </a:r>
             <a:endParaRPr b="0" lang="de-DE" sz="2100" spc="-1" strike="noStrike">
               <a:solidFill>
@@ -13586,7 +13970,7 @@
                 <a:tab algn="l" pos="0"/>
               </a:tabLst>
             </a:pPr>
-            <a:fld id="{B5225511-80EA-43F3-A90F-4566B55F0EA1}" type="slidenum">
+            <a:fld id="{432CC4FE-A53C-4467-BB6E-EE2A0D5FE23C}" type="slidenum">
               <a:rPr b="0" lang="en-US" sz="900" spc="-1" strike="noStrike">
                 <a:solidFill>
                   <a:srgbClr val="ffffff"/>
@@ -14258,7 +14642,7 @@
                 </a:solidFill>
                 <a:latin typeface="Arial"/>
               </a:rPr>
-              <a:t>Click </a:t>
+              <a:t>C</a:t>
             </a:r>
             <a:r>
               <a:rPr b="0" lang="de-DE" sz="2100" spc="-1" strike="noStrike">
@@ -14267,7 +14651,7 @@
                 </a:solidFill>
                 <a:latin typeface="Arial"/>
               </a:rPr>
-              <a:t>to edit </a:t>
+              <a:t>li</a:t>
             </a:r>
             <a:r>
               <a:rPr b="0" lang="de-DE" sz="2100" spc="-1" strike="noStrike">
@@ -14276,7 +14660,7 @@
                 </a:solidFill>
                 <a:latin typeface="Arial"/>
               </a:rPr>
-              <a:t>the </a:t>
+              <a:t>c</a:t>
             </a:r>
             <a:r>
               <a:rPr b="0" lang="de-DE" sz="2100" spc="-1" strike="noStrike">
@@ -14285,7 +14669,7 @@
                 </a:solidFill>
                 <a:latin typeface="Arial"/>
               </a:rPr>
-              <a:t>title </a:t>
+              <a:t>k </a:t>
             </a:r>
             <a:r>
               <a:rPr b="0" lang="de-DE" sz="2100" spc="-1" strike="noStrike">
@@ -14294,7 +14678,7 @@
                 </a:solidFill>
                 <a:latin typeface="Arial"/>
               </a:rPr>
-              <a:t>text </a:t>
+              <a:t>t</a:t>
             </a:r>
             <a:r>
               <a:rPr b="0" lang="de-DE" sz="2100" spc="-1" strike="noStrike">
@@ -14303,7 +14687,160 @@
                 </a:solidFill>
                 <a:latin typeface="Arial"/>
               </a:rPr>
-              <a:t>format</a:t>
+              <a:t>o </a:t>
+            </a:r>
+            <a:r>
+              <a:rPr b="0" lang="de-DE" sz="2100" spc="-1" strike="noStrike">
+                <a:solidFill>
+                  <a:srgbClr val="ffffff"/>
+                </a:solidFill>
+                <a:latin typeface="Arial"/>
+              </a:rPr>
+              <a:t>e</a:t>
+            </a:r>
+            <a:r>
+              <a:rPr b="0" lang="de-DE" sz="2100" spc="-1" strike="noStrike">
+                <a:solidFill>
+                  <a:srgbClr val="ffffff"/>
+                </a:solidFill>
+                <a:latin typeface="Arial"/>
+              </a:rPr>
+              <a:t>di</a:t>
+            </a:r>
+            <a:r>
+              <a:rPr b="0" lang="de-DE" sz="2100" spc="-1" strike="noStrike">
+                <a:solidFill>
+                  <a:srgbClr val="ffffff"/>
+                </a:solidFill>
+                <a:latin typeface="Arial"/>
+              </a:rPr>
+              <a:t>t </a:t>
+            </a:r>
+            <a:r>
+              <a:rPr b="0" lang="de-DE" sz="2100" spc="-1" strike="noStrike">
+                <a:solidFill>
+                  <a:srgbClr val="ffffff"/>
+                </a:solidFill>
+                <a:latin typeface="Arial"/>
+              </a:rPr>
+              <a:t>t</a:t>
+            </a:r>
+            <a:r>
+              <a:rPr b="0" lang="de-DE" sz="2100" spc="-1" strike="noStrike">
+                <a:solidFill>
+                  <a:srgbClr val="ffffff"/>
+                </a:solidFill>
+                <a:latin typeface="Arial"/>
+              </a:rPr>
+              <a:t>h</a:t>
+            </a:r>
+            <a:r>
+              <a:rPr b="0" lang="de-DE" sz="2100" spc="-1" strike="noStrike">
+                <a:solidFill>
+                  <a:srgbClr val="ffffff"/>
+                </a:solidFill>
+                <a:latin typeface="Arial"/>
+              </a:rPr>
+              <a:t>e </a:t>
+            </a:r>
+            <a:r>
+              <a:rPr b="0" lang="de-DE" sz="2100" spc="-1" strike="noStrike">
+                <a:solidFill>
+                  <a:srgbClr val="ffffff"/>
+                </a:solidFill>
+                <a:latin typeface="Arial"/>
+              </a:rPr>
+              <a:t>tit</a:t>
+            </a:r>
+            <a:r>
+              <a:rPr b="0" lang="de-DE" sz="2100" spc="-1" strike="noStrike">
+                <a:solidFill>
+                  <a:srgbClr val="ffffff"/>
+                </a:solidFill>
+                <a:latin typeface="Arial"/>
+              </a:rPr>
+              <a:t>le </a:t>
+            </a:r>
+            <a:r>
+              <a:rPr b="0" lang="de-DE" sz="2100" spc="-1" strike="noStrike">
+                <a:solidFill>
+                  <a:srgbClr val="ffffff"/>
+                </a:solidFill>
+                <a:latin typeface="Arial"/>
+              </a:rPr>
+              <a:t>t</a:t>
+            </a:r>
+            <a:r>
+              <a:rPr b="0" lang="de-DE" sz="2100" spc="-1" strike="noStrike">
+                <a:solidFill>
+                  <a:srgbClr val="ffffff"/>
+                </a:solidFill>
+                <a:latin typeface="Arial"/>
+              </a:rPr>
+              <a:t>e</a:t>
+            </a:r>
+            <a:r>
+              <a:rPr b="0" lang="de-DE" sz="2100" spc="-1" strike="noStrike">
+                <a:solidFill>
+                  <a:srgbClr val="ffffff"/>
+                </a:solidFill>
+                <a:latin typeface="Arial"/>
+              </a:rPr>
+              <a:t>xt </a:t>
+            </a:r>
+            <a:r>
+              <a:rPr b="0" lang="de-DE" sz="2100" spc="-1" strike="noStrike">
+                <a:solidFill>
+                  <a:srgbClr val="ffffff"/>
+                </a:solidFill>
+                <a:latin typeface="Arial"/>
+              </a:rPr>
+              <a:t>f</a:t>
+            </a:r>
+            <a:r>
+              <a:rPr b="0" lang="de-DE" sz="2100" spc="-1" strike="noStrike">
+                <a:solidFill>
+                  <a:srgbClr val="ffffff"/>
+                </a:solidFill>
+                <a:latin typeface="Arial"/>
+              </a:rPr>
+              <a:t>o</a:t>
+            </a:r>
+            <a:r>
+              <a:rPr b="0" lang="de-DE" sz="2100" spc="-1" strike="noStrike">
+                <a:solidFill>
+                  <a:srgbClr val="ffffff"/>
+                </a:solidFill>
+                <a:latin typeface="Arial"/>
+              </a:rPr>
+              <a:t>r</a:t>
+            </a:r>
+            <a:r>
+              <a:rPr b="0" lang="de-DE" sz="2100" spc="-1" strike="noStrike">
+                <a:solidFill>
+                  <a:srgbClr val="ffffff"/>
+                </a:solidFill>
+                <a:latin typeface="Arial"/>
+              </a:rPr>
+              <a:t>m</a:t>
+            </a:r>
+            <a:r>
+              <a:rPr b="0" lang="de-DE" sz="2100" spc="-1" strike="noStrike">
+                <a:solidFill>
+                  <a:srgbClr val="ffffff"/>
+                </a:solidFill>
+                <a:latin typeface="Arial"/>
+              </a:rPr>
+              <a:t>a</a:t>
+            </a:r>
+            <a:r>
+              <a:rPr b="0" lang="de-DE" sz="2100" spc="-1" strike="noStrike">
+                <a:solidFill>
+                  <a:srgbClr val="ffffff"/>
+                </a:solidFill>
+                <a:latin typeface="Arial"/>
+              </a:rPr>
+              <a:t>t</a:t>
             </a:r>
             <a:endParaRPr b="0" lang="de-DE" sz="2100" spc="-1" strike="noStrike">
               <a:solidFill>
@@ -14617,7 +15154,7 @@
                 <a:tab algn="l" pos="0"/>
               </a:tabLst>
             </a:pPr>
-            <a:fld id="{E4631E1E-D693-4B1C-B44D-A4EAEDDA1E30}" type="slidenum">
+            <a:fld id="{283408A0-CB41-46A2-93A3-08294840CC6D}" type="slidenum">
               <a:rPr b="0" lang="en-US" sz="900" spc="-1" strike="noStrike">
                 <a:solidFill>
                   <a:srgbClr val="ffffff"/>
@@ -15000,7 +15537,7 @@
                 </a:solidFill>
                 <a:latin typeface="Arial"/>
               </a:rPr>
-              <a:t>Insert </a:t>
+              <a:t>I</a:t>
             </a:r>
             <a:r>
               <a:rPr b="1" lang="en-US" sz="2400" spc="-1" strike="noStrike">
@@ -15009,7 +15546,7 @@
                 </a:solidFill>
                 <a:latin typeface="Arial"/>
               </a:rPr>
-              <a:t>page </a:t>
+              <a:t>n</a:t>
             </a:r>
             <a:r>
               <a:rPr b="1" lang="en-US" sz="2400" spc="-1" strike="noStrike">
@@ -15018,7 +15555,7 @@
                 </a:solidFill>
                 <a:latin typeface="Arial"/>
               </a:rPr>
-              <a:t>title </a:t>
+              <a:t>s</a:t>
             </a:r>
             <a:r>
               <a:rPr b="1" lang="en-US" sz="2400" spc="-1" strike="noStrike">
@@ -15027,7 +15564,7 @@
                 </a:solidFill>
                 <a:latin typeface="Arial"/>
               </a:rPr>
-              <a:t>(sente</a:t>
+              <a:t>e</a:t>
             </a:r>
             <a:r>
               <a:rPr b="1" lang="en-US" sz="2400" spc="-1" strike="noStrike">
@@ -15036,7 +15573,7 @@
                 </a:solidFill>
                 <a:latin typeface="Arial"/>
               </a:rPr>
-              <a:t>nce </a:t>
+              <a:t>r</a:t>
             </a:r>
             <a:r>
               <a:rPr b="1" lang="en-US" sz="2400" spc="-1" strike="noStrike">
@@ -15045,7 +15582,214 @@
                 </a:solidFill>
                 <a:latin typeface="Arial"/>
               </a:rPr>
-              <a:t>case)</a:t>
+              <a:t>t </a:t>
+            </a:r>
+            <a:r>
+              <a:rPr b="1" lang="en-US" sz="2400" spc="-1" strike="noStrike">
+                <a:solidFill>
+                  <a:srgbClr val="ffffff"/>
+                </a:solidFill>
+                <a:latin typeface="Arial"/>
+              </a:rPr>
+              <a:t>p</a:t>
+            </a:r>
+            <a:r>
+              <a:rPr b="1" lang="en-US" sz="2400" spc="-1" strike="noStrike">
+                <a:solidFill>
+                  <a:srgbClr val="ffffff"/>
+                </a:solidFill>
+                <a:latin typeface="Arial"/>
+              </a:rPr>
+              <a:t>a</a:t>
+            </a:r>
+            <a:r>
+              <a:rPr b="1" lang="en-US" sz="2400" spc="-1" strike="noStrike">
+                <a:solidFill>
+                  <a:srgbClr val="ffffff"/>
+                </a:solidFill>
+                <a:latin typeface="Arial"/>
+              </a:rPr>
+              <a:t>g</a:t>
+            </a:r>
+            <a:r>
+              <a:rPr b="1" lang="en-US" sz="2400" spc="-1" strike="noStrike">
+                <a:solidFill>
+                  <a:srgbClr val="ffffff"/>
+                </a:solidFill>
+                <a:latin typeface="Arial"/>
+              </a:rPr>
+              <a:t>e </a:t>
+            </a:r>
+            <a:r>
+              <a:rPr b="1" lang="en-US" sz="2400" spc="-1" strike="noStrike">
+                <a:solidFill>
+                  <a:srgbClr val="ffffff"/>
+                </a:solidFill>
+                <a:latin typeface="Arial"/>
+              </a:rPr>
+              <a:t>t</a:t>
+            </a:r>
+            <a:r>
+              <a:rPr b="1" lang="en-US" sz="2400" spc="-1" strike="noStrike">
+                <a:solidFill>
+                  <a:srgbClr val="ffffff"/>
+                </a:solidFill>
+                <a:latin typeface="Arial"/>
+              </a:rPr>
+              <a:t>i</a:t>
+            </a:r>
+            <a:r>
+              <a:rPr b="1" lang="en-US" sz="2400" spc="-1" strike="noStrike">
+                <a:solidFill>
+                  <a:srgbClr val="ffffff"/>
+                </a:solidFill>
+                <a:latin typeface="Arial"/>
+              </a:rPr>
+              <a:t>t</a:t>
+            </a:r>
+            <a:r>
+              <a:rPr b="1" lang="en-US" sz="2400" spc="-1" strike="noStrike">
+                <a:solidFill>
+                  <a:srgbClr val="ffffff"/>
+                </a:solidFill>
+                <a:latin typeface="Arial"/>
+              </a:rPr>
+              <a:t>l</a:t>
+            </a:r>
+            <a:r>
+              <a:rPr b="1" lang="en-US" sz="2400" spc="-1" strike="noStrike">
+                <a:solidFill>
+                  <a:srgbClr val="ffffff"/>
+                </a:solidFill>
+                <a:latin typeface="Arial"/>
+              </a:rPr>
+              <a:t>e </a:t>
+            </a:r>
+            <a:r>
+              <a:rPr b="1" lang="en-US" sz="2400" spc="-1" strike="noStrike">
+                <a:solidFill>
+                  <a:srgbClr val="ffffff"/>
+                </a:solidFill>
+                <a:latin typeface="Arial"/>
+              </a:rPr>
+              <a:t>(</a:t>
+            </a:r>
+            <a:r>
+              <a:rPr b="1" lang="en-US" sz="2400" spc="-1" strike="noStrike">
+                <a:solidFill>
+                  <a:srgbClr val="ffffff"/>
+                </a:solidFill>
+                <a:latin typeface="Arial"/>
+              </a:rPr>
+              <a:t>s</a:t>
+            </a:r>
+            <a:r>
+              <a:rPr b="1" lang="en-US" sz="2400" spc="-1" strike="noStrike">
+                <a:solidFill>
+                  <a:srgbClr val="ffffff"/>
+                </a:solidFill>
+                <a:latin typeface="Arial"/>
+              </a:rPr>
+              <a:t>e</a:t>
+            </a:r>
+            <a:r>
+              <a:rPr b="1" lang="en-US" sz="2400" spc="-1" strike="noStrike">
+                <a:solidFill>
+                  <a:srgbClr val="ffffff"/>
+                </a:solidFill>
+                <a:latin typeface="Arial"/>
+              </a:rPr>
+              <a:t>n</a:t>
+            </a:r>
+            <a:r>
+              <a:rPr b="1" lang="en-US" sz="2400" spc="-1" strike="noStrike">
+                <a:solidFill>
+                  <a:srgbClr val="ffffff"/>
+                </a:solidFill>
+                <a:latin typeface="Arial"/>
+              </a:rPr>
+              <a:t>t</a:t>
+            </a:r>
+            <a:r>
+              <a:rPr b="1" lang="en-US" sz="2400" spc="-1" strike="noStrike">
+                <a:solidFill>
+                  <a:srgbClr val="ffffff"/>
+                </a:solidFill>
+                <a:latin typeface="Arial"/>
+              </a:rPr>
+              <a:t>e</a:t>
+            </a:r>
+            <a:r>
+              <a:rPr b="1" lang="en-US" sz="2400" spc="-1" strike="noStrike">
+                <a:solidFill>
+                  <a:srgbClr val="ffffff"/>
+                </a:solidFill>
+                <a:latin typeface="Arial"/>
+              </a:rPr>
+              <a:t>n</a:t>
+            </a:r>
+            <a:r>
+              <a:rPr b="1" lang="en-US" sz="2400" spc="-1" strike="noStrike">
+                <a:solidFill>
+                  <a:srgbClr val="ffffff"/>
+                </a:solidFill>
+                <a:latin typeface="Arial"/>
+              </a:rPr>
+              <a:t>c</a:t>
+            </a:r>
+            <a:r>
+              <a:rPr b="1" lang="en-US" sz="2400" spc="-1" strike="noStrike">
+                <a:solidFill>
+                  <a:srgbClr val="ffffff"/>
+                </a:solidFill>
+                <a:latin typeface="Arial"/>
+              </a:rPr>
+              <a:t>e </a:t>
+            </a:r>
+            <a:r>
+              <a:rPr b="1" lang="en-US" sz="2400" spc="-1" strike="noStrike">
+                <a:solidFill>
+                  <a:srgbClr val="ffffff"/>
+                </a:solidFill>
+                <a:latin typeface="Arial"/>
+              </a:rPr>
+              <a:t>c</a:t>
+            </a:r>
+            <a:r>
+              <a:rPr b="1" lang="en-US" sz="2400" spc="-1" strike="noStrike">
+                <a:solidFill>
+                  <a:srgbClr val="ffffff"/>
+                </a:solidFill>
+                <a:latin typeface="Arial"/>
+              </a:rPr>
+              <a:t>a</a:t>
+            </a:r>
+            <a:r>
+              <a:rPr b="1" lang="en-US" sz="2400" spc="-1" strike="noStrike">
+                <a:solidFill>
+                  <a:srgbClr val="ffffff"/>
+                </a:solidFill>
+                <a:latin typeface="Arial"/>
+              </a:rPr>
+              <a:t>s</a:t>
+            </a:r>
+            <a:r>
+              <a:rPr b="1" lang="en-US" sz="2400" spc="-1" strike="noStrike">
+                <a:solidFill>
+                  <a:srgbClr val="ffffff"/>
+                </a:solidFill>
+                <a:latin typeface="Arial"/>
+              </a:rPr>
+              <a:t>e</a:t>
+            </a:r>
+            <a:r>
+              <a:rPr b="1" lang="en-US" sz="2400" spc="-1" strike="noStrike">
+                <a:solidFill>
+                  <a:srgbClr val="ffffff"/>
+                </a:solidFill>
+                <a:latin typeface="Arial"/>
+              </a:rPr>
+              <a:t>)</a:t>
             </a:r>
             <a:endParaRPr b="0" lang="de-DE" sz="2400" spc="-1" strike="noStrike">
               <a:solidFill>
@@ -18833,7 +19577,34 @@
                 </a:solidFill>
                 <a:latin typeface="Arial"/>
               </a:rPr>
-              <a:t>MongoDB Replica Sets</a:t>
+              <a:t>Mongo</a:t>
+            </a:r>
+            <a:r>
+              <a:rPr b="1" lang="en-US" sz="2400" spc="-1" strike="noStrike">
+                <a:solidFill>
+                  <a:srgbClr val="ffffff"/>
+                </a:solidFill>
+                <a:latin typeface="Arial"/>
+              </a:rPr>
+              <a:t>DB </a:t>
+            </a:r>
+            <a:r>
+              <a:rPr b="1" lang="en-US" sz="2400" spc="-1" strike="noStrike">
+                <a:solidFill>
+                  <a:srgbClr val="ffffff"/>
+                </a:solidFill>
+                <a:latin typeface="Arial"/>
+              </a:rPr>
+              <a:t>Replic</a:t>
+            </a:r>
+            <a:r>
+              <a:rPr b="1" lang="en-US" sz="2400" spc="-1" strike="noStrike">
+                <a:solidFill>
+                  <a:srgbClr val="ffffff"/>
+                </a:solidFill>
+                <a:latin typeface="Arial"/>
+              </a:rPr>
+              <a:t>a Sets</a:t>
             </a:r>
             <a:endParaRPr b="0" lang="de-DE" sz="2400" spc="-1" strike="noStrike">
               <a:solidFill>
@@ -31189,34 +31960,7 @@
                 </a:solidFill>
                 <a:latin typeface="Arial"/>
               </a:rPr>
-              <a:t>ALB</a:t>
-            </a:r>
-            <a:r>
-              <a:rPr b="1" lang="en-US" sz="2400" spc="-1" strike="noStrike">
-                <a:solidFill>
-                  <a:srgbClr val="ffffff"/>
-                </a:solidFill>
-                <a:latin typeface="Arial"/>
-              </a:rPr>
-              <a:t>s </a:t>
-            </a:r>
-            <a:r>
-              <a:rPr b="1" lang="en-US" sz="2400" spc="-1" strike="noStrike">
-                <a:solidFill>
-                  <a:srgbClr val="ffffff"/>
-                </a:solidFill>
-                <a:latin typeface="Arial"/>
-              </a:rPr>
-              <a:t>and </a:t>
-            </a:r>
-            <a:r>
-              <a:rPr b="1" lang="en-US" sz="2400" spc="-1" strike="noStrike">
-                <a:solidFill>
-                  <a:srgbClr val="ffffff"/>
-                </a:solidFill>
-                <a:latin typeface="Arial"/>
-              </a:rPr>
-              <a:t>DNS</a:t>
+              <a:t>ALBs and DNS</a:t>
             </a:r>
             <a:endParaRPr b="0" lang="de-DE" sz="2400" spc="-1" strike="noStrike">
               <a:solidFill>
@@ -37208,7 +37952,637 @@
                 </a:solidFill>
                 <a:latin typeface="Arial"/>
               </a:rPr>
-              <a:t>Peered Multi-Region VPCs with Multiple ALBs and Global Accelerator (GA)</a:t>
+              <a:t>P</a:t>
+            </a:r>
+            <a:r>
+              <a:rPr b="1" lang="en-US" sz="2400" spc="-1" strike="noStrike">
+                <a:solidFill>
+                  <a:srgbClr val="ffffff"/>
+                </a:solidFill>
+                <a:latin typeface="Arial"/>
+              </a:rPr>
+              <a:t>e</a:t>
+            </a:r>
+            <a:r>
+              <a:rPr b="1" lang="en-US" sz="2400" spc="-1" strike="noStrike">
+                <a:solidFill>
+                  <a:srgbClr val="ffffff"/>
+                </a:solidFill>
+                <a:latin typeface="Arial"/>
+              </a:rPr>
+              <a:t>e</a:t>
+            </a:r>
+            <a:r>
+              <a:rPr b="1" lang="en-US" sz="2400" spc="-1" strike="noStrike">
+                <a:solidFill>
+                  <a:srgbClr val="ffffff"/>
+                </a:solidFill>
+                <a:latin typeface="Arial"/>
+              </a:rPr>
+              <a:t>r</a:t>
+            </a:r>
+            <a:r>
+              <a:rPr b="1" lang="en-US" sz="2400" spc="-1" strike="noStrike">
+                <a:solidFill>
+                  <a:srgbClr val="ffffff"/>
+                </a:solidFill>
+                <a:latin typeface="Arial"/>
+              </a:rPr>
+              <a:t>e</a:t>
+            </a:r>
+            <a:r>
+              <a:rPr b="1" lang="en-US" sz="2400" spc="-1" strike="noStrike">
+                <a:solidFill>
+                  <a:srgbClr val="ffffff"/>
+                </a:solidFill>
+                <a:latin typeface="Arial"/>
+              </a:rPr>
+              <a:t>d</a:t>
+            </a:r>
+            <a:r>
+              <a:rPr b="1" lang="en-US" sz="2400" spc="-1" strike="noStrike">
+                <a:solidFill>
+                  <a:srgbClr val="ffffff"/>
+                </a:solidFill>
+                <a:latin typeface="Arial"/>
+              </a:rPr>
+              <a:t> </a:t>
+            </a:r>
+            <a:r>
+              <a:rPr b="1" lang="en-US" sz="2400" spc="-1" strike="noStrike">
+                <a:solidFill>
+                  <a:srgbClr val="ffffff"/>
+                </a:solidFill>
+                <a:latin typeface="Arial"/>
+              </a:rPr>
+              <a:t>M</a:t>
+            </a:r>
+            <a:r>
+              <a:rPr b="1" lang="en-US" sz="2400" spc="-1" strike="noStrike">
+                <a:solidFill>
+                  <a:srgbClr val="ffffff"/>
+                </a:solidFill>
+                <a:latin typeface="Arial"/>
+              </a:rPr>
+              <a:t>u</a:t>
+            </a:r>
+            <a:r>
+              <a:rPr b="1" lang="en-US" sz="2400" spc="-1" strike="noStrike">
+                <a:solidFill>
+                  <a:srgbClr val="ffffff"/>
+                </a:solidFill>
+                <a:latin typeface="Arial"/>
+              </a:rPr>
+              <a:t>l</a:t>
+            </a:r>
+            <a:r>
+              <a:rPr b="1" lang="en-US" sz="2400" spc="-1" strike="noStrike">
+                <a:solidFill>
+                  <a:srgbClr val="ffffff"/>
+                </a:solidFill>
+                <a:latin typeface="Arial"/>
+              </a:rPr>
+              <a:t>t</a:t>
+            </a:r>
+            <a:r>
+              <a:rPr b="1" lang="en-US" sz="2400" spc="-1" strike="noStrike">
+                <a:solidFill>
+                  <a:srgbClr val="ffffff"/>
+                </a:solidFill>
+                <a:latin typeface="Arial"/>
+              </a:rPr>
+              <a:t>i</a:t>
+            </a:r>
+            <a:r>
+              <a:rPr b="1" lang="en-US" sz="2400" spc="-1" strike="noStrike">
+                <a:solidFill>
+                  <a:srgbClr val="ffffff"/>
+                </a:solidFill>
+                <a:latin typeface="Arial"/>
+              </a:rPr>
+              <a:t>-</a:t>
+            </a:r>
+            <a:r>
+              <a:rPr b="1" lang="en-US" sz="2400" spc="-1" strike="noStrike">
+                <a:solidFill>
+                  <a:srgbClr val="ffffff"/>
+                </a:solidFill>
+                <a:latin typeface="Arial"/>
+              </a:rPr>
+              <a:t>R</a:t>
+            </a:r>
+            <a:r>
+              <a:rPr b="1" lang="en-US" sz="2400" spc="-1" strike="noStrike">
+                <a:solidFill>
+                  <a:srgbClr val="ffffff"/>
+                </a:solidFill>
+                <a:latin typeface="Arial"/>
+              </a:rPr>
+              <a:t>e</a:t>
+            </a:r>
+            <a:r>
+              <a:rPr b="1" lang="en-US" sz="2400" spc="-1" strike="noStrike">
+                <a:solidFill>
+                  <a:srgbClr val="ffffff"/>
+                </a:solidFill>
+                <a:latin typeface="Arial"/>
+              </a:rPr>
+              <a:t>g</a:t>
+            </a:r>
+            <a:r>
+              <a:rPr b="1" lang="en-US" sz="2400" spc="-1" strike="noStrike">
+                <a:solidFill>
+                  <a:srgbClr val="ffffff"/>
+                </a:solidFill>
+                <a:latin typeface="Arial"/>
+              </a:rPr>
+              <a:t>i</a:t>
+            </a:r>
+            <a:r>
+              <a:rPr b="1" lang="en-US" sz="2400" spc="-1" strike="noStrike">
+                <a:solidFill>
+                  <a:srgbClr val="ffffff"/>
+                </a:solidFill>
+                <a:latin typeface="Arial"/>
+              </a:rPr>
+              <a:t>o</a:t>
+            </a:r>
+            <a:r>
+              <a:rPr b="1" lang="en-US" sz="2400" spc="-1" strike="noStrike">
+                <a:solidFill>
+                  <a:srgbClr val="ffffff"/>
+                </a:solidFill>
+                <a:latin typeface="Arial"/>
+              </a:rPr>
+              <a:t>n</a:t>
+            </a:r>
+            <a:r>
+              <a:rPr b="1" lang="en-US" sz="2400" spc="-1" strike="noStrike">
+                <a:solidFill>
+                  <a:srgbClr val="ffffff"/>
+                </a:solidFill>
+                <a:latin typeface="Arial"/>
+              </a:rPr>
+              <a:t> </a:t>
+            </a:r>
+            <a:r>
+              <a:rPr b="1" lang="en-US" sz="2400" spc="-1" strike="noStrike">
+                <a:solidFill>
+                  <a:srgbClr val="ffffff"/>
+                </a:solidFill>
+                <a:latin typeface="Arial"/>
+              </a:rPr>
+              <a:t>V</a:t>
+            </a:r>
+            <a:r>
+              <a:rPr b="1" lang="en-US" sz="2400" spc="-1" strike="noStrike">
+                <a:solidFill>
+                  <a:srgbClr val="ffffff"/>
+                </a:solidFill>
+                <a:latin typeface="Arial"/>
+              </a:rPr>
+              <a:t>P</a:t>
+            </a:r>
+            <a:r>
+              <a:rPr b="1" lang="en-US" sz="2400" spc="-1" strike="noStrike">
+                <a:solidFill>
+                  <a:srgbClr val="ffffff"/>
+                </a:solidFill>
+                <a:latin typeface="Arial"/>
+              </a:rPr>
+              <a:t>C</a:t>
+            </a:r>
+            <a:r>
+              <a:rPr b="1" lang="en-US" sz="2400" spc="-1" strike="noStrike">
+                <a:solidFill>
+                  <a:srgbClr val="ffffff"/>
+                </a:solidFill>
+                <a:latin typeface="Arial"/>
+              </a:rPr>
+              <a:t>s</a:t>
+            </a:r>
+            <a:r>
+              <a:rPr b="1" lang="en-US" sz="2400" spc="-1" strike="noStrike">
+                <a:solidFill>
+                  <a:srgbClr val="ffffff"/>
+                </a:solidFill>
+                <a:latin typeface="Arial"/>
+              </a:rPr>
+              <a:t> </a:t>
+            </a:r>
+            <a:r>
+              <a:rPr b="1" lang="en-US" sz="2400" spc="-1" strike="noStrike">
+                <a:solidFill>
+                  <a:srgbClr val="ffffff"/>
+                </a:solidFill>
+                <a:latin typeface="Arial"/>
+              </a:rPr>
+              <a:t>w</a:t>
+            </a:r>
+            <a:r>
+              <a:rPr b="1" lang="en-US" sz="2400" spc="-1" strike="noStrike">
+                <a:solidFill>
+                  <a:srgbClr val="ffffff"/>
+                </a:solidFill>
+                <a:latin typeface="Arial"/>
+              </a:rPr>
+              <a:t>i</a:t>
+            </a:r>
+            <a:r>
+              <a:rPr b="1" lang="en-US" sz="2400" spc="-1" strike="noStrike">
+                <a:solidFill>
+                  <a:srgbClr val="ffffff"/>
+                </a:solidFill>
+                <a:latin typeface="Arial"/>
+              </a:rPr>
+              <a:t>t</a:t>
+            </a:r>
+            <a:r>
+              <a:rPr b="1" lang="en-US" sz="2400" spc="-1" strike="noStrike">
+                <a:solidFill>
+                  <a:srgbClr val="ffffff"/>
+                </a:solidFill>
+                <a:latin typeface="Arial"/>
+              </a:rPr>
+              <a:t>h</a:t>
+            </a:r>
+            <a:r>
+              <a:rPr b="1" lang="en-US" sz="2400" spc="-1" strike="noStrike">
+                <a:solidFill>
+                  <a:srgbClr val="ffffff"/>
+                </a:solidFill>
+                <a:latin typeface="Arial"/>
+              </a:rPr>
+              <a:t> </a:t>
+            </a:r>
+            <a:r>
+              <a:rPr b="1" lang="en-US" sz="2400" spc="-1" strike="noStrike">
+                <a:solidFill>
+                  <a:srgbClr val="ffffff"/>
+                </a:solidFill>
+                <a:latin typeface="Arial"/>
+              </a:rPr>
+              <a:t>M</a:t>
+            </a:r>
+            <a:r>
+              <a:rPr b="1" lang="en-US" sz="2400" spc="-1" strike="noStrike">
+                <a:solidFill>
+                  <a:srgbClr val="ffffff"/>
+                </a:solidFill>
+                <a:latin typeface="Arial"/>
+              </a:rPr>
+              <a:t>u</a:t>
+            </a:r>
+            <a:r>
+              <a:rPr b="1" lang="en-US" sz="2400" spc="-1" strike="noStrike">
+                <a:solidFill>
+                  <a:srgbClr val="ffffff"/>
+                </a:solidFill>
+                <a:latin typeface="Arial"/>
+              </a:rPr>
+              <a:t>l</a:t>
+            </a:r>
+            <a:r>
+              <a:rPr b="1" lang="en-US" sz="2400" spc="-1" strike="noStrike">
+                <a:solidFill>
+                  <a:srgbClr val="ffffff"/>
+                </a:solidFill>
+                <a:latin typeface="Arial"/>
+              </a:rPr>
+              <a:t>t</a:t>
+            </a:r>
+            <a:r>
+              <a:rPr b="1" lang="en-US" sz="2400" spc="-1" strike="noStrike">
+                <a:solidFill>
+                  <a:srgbClr val="ffffff"/>
+                </a:solidFill>
+                <a:latin typeface="Arial"/>
+              </a:rPr>
+              <a:t>i</a:t>
+            </a:r>
+            <a:r>
+              <a:rPr b="1" lang="en-US" sz="2400" spc="-1" strike="noStrike">
+                <a:solidFill>
+                  <a:srgbClr val="ffffff"/>
+                </a:solidFill>
+                <a:latin typeface="Arial"/>
+              </a:rPr>
+              <a:t>p</a:t>
+            </a:r>
+            <a:r>
+              <a:rPr b="1" lang="en-US" sz="2400" spc="-1" strike="noStrike">
+                <a:solidFill>
+                  <a:srgbClr val="ffffff"/>
+                </a:solidFill>
+                <a:latin typeface="Arial"/>
+              </a:rPr>
+              <a:t>l</a:t>
+            </a:r>
+            <a:r>
+              <a:rPr b="1" lang="en-US" sz="2400" spc="-1" strike="noStrike">
+                <a:solidFill>
+                  <a:srgbClr val="ffffff"/>
+                </a:solidFill>
+                <a:latin typeface="Arial"/>
+              </a:rPr>
+              <a:t>e</a:t>
+            </a:r>
+            <a:r>
+              <a:rPr b="1" lang="en-US" sz="2400" spc="-1" strike="noStrike">
+                <a:solidFill>
+                  <a:srgbClr val="ffffff"/>
+                </a:solidFill>
+                <a:latin typeface="Arial"/>
+              </a:rPr>
+              <a:t> </a:t>
+            </a:r>
+            <a:r>
+              <a:rPr b="1" lang="en-US" sz="2400" spc="-1" strike="noStrike">
+                <a:solidFill>
+                  <a:srgbClr val="ffffff"/>
+                </a:solidFill>
+                <a:latin typeface="Arial"/>
+              </a:rPr>
+              <a:t>A</a:t>
+            </a:r>
+            <a:r>
+              <a:rPr b="1" lang="en-US" sz="2400" spc="-1" strike="noStrike">
+                <a:solidFill>
+                  <a:srgbClr val="ffffff"/>
+                </a:solidFill>
+                <a:latin typeface="Arial"/>
+              </a:rPr>
+              <a:t>L</a:t>
+            </a:r>
+            <a:r>
+              <a:rPr b="1" lang="en-US" sz="2400" spc="-1" strike="noStrike">
+                <a:solidFill>
+                  <a:srgbClr val="ffffff"/>
+                </a:solidFill>
+                <a:latin typeface="Arial"/>
+              </a:rPr>
+              <a:t>B</a:t>
+            </a:r>
+            <a:r>
+              <a:rPr b="1" lang="en-US" sz="2400" spc="-1" strike="noStrike">
+                <a:solidFill>
+                  <a:srgbClr val="ffffff"/>
+                </a:solidFill>
+                <a:latin typeface="Arial"/>
+              </a:rPr>
+              <a:t>s</a:t>
+            </a:r>
+            <a:r>
+              <a:rPr b="1" lang="en-US" sz="2400" spc="-1" strike="noStrike">
+                <a:solidFill>
+                  <a:srgbClr val="ffffff"/>
+                </a:solidFill>
+                <a:latin typeface="Arial"/>
+              </a:rPr>
+              <a:t> </a:t>
+            </a:r>
+            <a:r>
+              <a:rPr b="1" lang="en-US" sz="2400" spc="-1" strike="noStrike">
+                <a:solidFill>
+                  <a:srgbClr val="ffffff"/>
+                </a:solidFill>
+                <a:latin typeface="Arial"/>
+              </a:rPr>
+              <a:t>a</a:t>
+            </a:r>
+            <a:r>
+              <a:rPr b="1" lang="en-US" sz="2400" spc="-1" strike="noStrike">
+                <a:solidFill>
+                  <a:srgbClr val="ffffff"/>
+                </a:solidFill>
+                <a:latin typeface="Arial"/>
+              </a:rPr>
+              <a:t>n</a:t>
+            </a:r>
+            <a:r>
+              <a:rPr b="1" lang="en-US" sz="2400" spc="-1" strike="noStrike">
+                <a:solidFill>
+                  <a:srgbClr val="ffffff"/>
+                </a:solidFill>
+                <a:latin typeface="Arial"/>
+              </a:rPr>
+              <a:t>d</a:t>
+            </a:r>
+            <a:r>
+              <a:rPr b="1" lang="en-US" sz="2400" spc="-1" strike="noStrike">
+                <a:solidFill>
+                  <a:srgbClr val="ffffff"/>
+                </a:solidFill>
+                <a:latin typeface="Arial"/>
+              </a:rPr>
+              <a:t> </a:t>
+            </a:r>
+            <a:r>
+              <a:rPr b="1" lang="en-US" sz="2400" spc="-1" strike="noStrike">
+                <a:solidFill>
+                  <a:srgbClr val="ffffff"/>
+                </a:solidFill>
+                <a:latin typeface="Arial"/>
+              </a:rPr>
+              <a:t>G</a:t>
+            </a:r>
+            <a:r>
+              <a:rPr b="1" lang="en-US" sz="2400" spc="-1" strike="noStrike">
+                <a:solidFill>
+                  <a:srgbClr val="ffffff"/>
+                </a:solidFill>
+                <a:latin typeface="Arial"/>
+              </a:rPr>
+              <a:t>l</a:t>
+            </a:r>
+            <a:r>
+              <a:rPr b="1" lang="en-US" sz="2400" spc="-1" strike="noStrike">
+                <a:solidFill>
+                  <a:srgbClr val="ffffff"/>
+                </a:solidFill>
+                <a:latin typeface="Arial"/>
+              </a:rPr>
+              <a:t>o</a:t>
+            </a:r>
+            <a:r>
+              <a:rPr b="1" lang="en-US" sz="2400" spc="-1" strike="noStrike">
+                <a:solidFill>
+                  <a:srgbClr val="ffffff"/>
+                </a:solidFill>
+                <a:latin typeface="Arial"/>
+              </a:rPr>
+              <a:t>b</a:t>
+            </a:r>
+            <a:r>
+              <a:rPr b="1" lang="en-US" sz="2400" spc="-1" strike="noStrike">
+                <a:solidFill>
+                  <a:srgbClr val="ffffff"/>
+                </a:solidFill>
+                <a:latin typeface="Arial"/>
+              </a:rPr>
+              <a:t>a</a:t>
+            </a:r>
+            <a:r>
+              <a:rPr b="1" lang="en-US" sz="2400" spc="-1" strike="noStrike">
+                <a:solidFill>
+                  <a:srgbClr val="ffffff"/>
+                </a:solidFill>
+                <a:latin typeface="Arial"/>
+              </a:rPr>
+              <a:t>l</a:t>
+            </a:r>
+            <a:r>
+              <a:rPr b="1" lang="en-US" sz="2400" spc="-1" strike="noStrike">
+                <a:solidFill>
+                  <a:srgbClr val="ffffff"/>
+                </a:solidFill>
+                <a:latin typeface="Arial"/>
+              </a:rPr>
+              <a:t> </a:t>
+            </a:r>
+            <a:r>
+              <a:rPr b="1" lang="en-US" sz="2400" spc="-1" strike="noStrike">
+                <a:solidFill>
+                  <a:srgbClr val="ffffff"/>
+                </a:solidFill>
+                <a:latin typeface="Arial"/>
+              </a:rPr>
+              <a:t>A</a:t>
+            </a:r>
+            <a:r>
+              <a:rPr b="1" lang="en-US" sz="2400" spc="-1" strike="noStrike">
+                <a:solidFill>
+                  <a:srgbClr val="ffffff"/>
+                </a:solidFill>
+                <a:latin typeface="Arial"/>
+              </a:rPr>
+              <a:t>c</a:t>
+            </a:r>
+            <a:r>
+              <a:rPr b="1" lang="en-US" sz="2400" spc="-1" strike="noStrike">
+                <a:solidFill>
+                  <a:srgbClr val="ffffff"/>
+                </a:solidFill>
+                <a:latin typeface="Arial"/>
+              </a:rPr>
+              <a:t>c</a:t>
+            </a:r>
+            <a:r>
+              <a:rPr b="1" lang="en-US" sz="2400" spc="-1" strike="noStrike">
+                <a:solidFill>
+                  <a:srgbClr val="ffffff"/>
+                </a:solidFill>
+                <a:latin typeface="Arial"/>
+              </a:rPr>
+              <a:t>e</a:t>
+            </a:r>
+            <a:r>
+              <a:rPr b="1" lang="en-US" sz="2400" spc="-1" strike="noStrike">
+                <a:solidFill>
+                  <a:srgbClr val="ffffff"/>
+                </a:solidFill>
+                <a:latin typeface="Arial"/>
+              </a:rPr>
+              <a:t>l</a:t>
+            </a:r>
+            <a:r>
+              <a:rPr b="1" lang="en-US" sz="2400" spc="-1" strike="noStrike">
+                <a:solidFill>
+                  <a:srgbClr val="ffffff"/>
+                </a:solidFill>
+                <a:latin typeface="Arial"/>
+              </a:rPr>
+              <a:t>e</a:t>
+            </a:r>
+            <a:r>
+              <a:rPr b="1" lang="en-US" sz="2400" spc="-1" strike="noStrike">
+                <a:solidFill>
+                  <a:srgbClr val="ffffff"/>
+                </a:solidFill>
+                <a:latin typeface="Arial"/>
+              </a:rPr>
+              <a:t>r</a:t>
+            </a:r>
+            <a:r>
+              <a:rPr b="1" lang="en-US" sz="2400" spc="-1" strike="noStrike">
+                <a:solidFill>
+                  <a:srgbClr val="ffffff"/>
+                </a:solidFill>
+                <a:latin typeface="Arial"/>
+              </a:rPr>
+              <a:t>a</a:t>
+            </a:r>
+            <a:r>
+              <a:rPr b="1" lang="en-US" sz="2400" spc="-1" strike="noStrike">
+                <a:solidFill>
+                  <a:srgbClr val="ffffff"/>
+                </a:solidFill>
+                <a:latin typeface="Arial"/>
+              </a:rPr>
+              <a:t>t</a:t>
+            </a:r>
+            <a:r>
+              <a:rPr b="1" lang="en-US" sz="2400" spc="-1" strike="noStrike">
+                <a:solidFill>
+                  <a:srgbClr val="ffffff"/>
+                </a:solidFill>
+                <a:latin typeface="Arial"/>
+              </a:rPr>
+              <a:t>o</a:t>
+            </a:r>
+            <a:r>
+              <a:rPr b="1" lang="en-US" sz="2400" spc="-1" strike="noStrike">
+                <a:solidFill>
+                  <a:srgbClr val="ffffff"/>
+                </a:solidFill>
+                <a:latin typeface="Arial"/>
+              </a:rPr>
+              <a:t>r</a:t>
+            </a:r>
+            <a:r>
+              <a:rPr b="1" lang="en-US" sz="2400" spc="-1" strike="noStrike">
+                <a:solidFill>
+                  <a:srgbClr val="ffffff"/>
+                </a:solidFill>
+                <a:latin typeface="Arial"/>
+              </a:rPr>
+              <a:t> </a:t>
+            </a:r>
+            <a:r>
+              <a:rPr b="1" lang="en-US" sz="2400" spc="-1" strike="noStrike">
+                <a:solidFill>
+                  <a:srgbClr val="ffffff"/>
+                </a:solidFill>
+                <a:latin typeface="Arial"/>
+              </a:rPr>
+              <a:t>(</a:t>
+            </a:r>
+            <a:r>
+              <a:rPr b="1" lang="en-US" sz="2400" spc="-1" strike="noStrike">
+                <a:solidFill>
+                  <a:srgbClr val="ffffff"/>
+                </a:solidFill>
+                <a:latin typeface="Arial"/>
+              </a:rPr>
+              <a:t>G</a:t>
+            </a:r>
+            <a:r>
+              <a:rPr b="1" lang="en-US" sz="2400" spc="-1" strike="noStrike">
+                <a:solidFill>
+                  <a:srgbClr val="ffffff"/>
+                </a:solidFill>
+                <a:latin typeface="Arial"/>
+              </a:rPr>
+              <a:t>A</a:t>
+            </a:r>
+            <a:r>
+              <a:rPr b="1" lang="en-US" sz="2400" spc="-1" strike="noStrike">
+                <a:solidFill>
+                  <a:srgbClr val="ffffff"/>
+                </a:solidFill>
+                <a:latin typeface="Arial"/>
+              </a:rPr>
+              <a:t>)</a:t>
             </a:r>
             <a:endParaRPr b="0" lang="de-DE" sz="2400" spc="-1" strike="noStrike">
               <a:solidFill>
@@ -37596,43 +38970,14 @@
                 <a:latin typeface="Arial"/>
                 <a:ea typeface="Arial Unicode MS"/>
               </a:rPr>
-              <a:t>m A </a:t>
+              <a:t>m Alias </a:t>
             </a:r>
             <a:r>
               <a:rPr b="0" lang="en-US" sz="900" spc="-1" strike="noStrike">
                 <a:latin typeface="Arial"/>
                 <a:ea typeface="Arial Unicode MS"/>
               </a:rPr>
-              <a:t>1.2.3.4</a:t>
-            </a:r>
-            <a:br/>
-            <a:r>
-              <a:rPr b="0" lang="en-US" sz="900" spc="-1" strike="noStrike">
-                <a:latin typeface="Arial"/>
-                <a:ea typeface="Arial Unicode MS"/>
-              </a:rPr>
-              <a:t>ghi.saps</a:t>
-            </a:r>
-            <a:r>
-              <a:rPr b="0" lang="en-US" sz="900" spc="-1" strike="noStrike">
-                <a:latin typeface="Arial"/>
-                <a:ea typeface="Arial Unicode MS"/>
-              </a:rPr>
-              <a:t>ailing.co</a:t>
-            </a:r>
-            <a:r>
-              <a:rPr b="0" lang="en-US" sz="900" spc="-1" strike="noStrike">
-                <a:latin typeface="Arial"/>
-                <a:ea typeface="Arial Unicode MS"/>
-              </a:rPr>
-              <a:t>m A </a:t>
-            </a:r>
-            <a:r>
-              <a:rPr b="0" lang="en-US" sz="900" spc="-1" strike="noStrike">
-                <a:latin typeface="Arial"/>
-                <a:ea typeface="Arial Unicode MS"/>
-              </a:rPr>
-              <a:t>2.3.4.5</a:t>
+              <a:t>to GA</a:t>
             </a:r>
             <a:endParaRPr b="0" lang="en-US" sz="900" spc="-1" strike="noStrike">
               <a:latin typeface="Arial"/>
@@ -42640,7 +43985,34 @@
                 </a:solidFill>
                 <a:latin typeface="Arial"/>
               </a:rPr>
-              <a:t>Archive Server Set-Up</a:t>
+              <a:t>Archiv</a:t>
+            </a:r>
+            <a:r>
+              <a:rPr b="1" lang="en-US" sz="2400" spc="-1" strike="noStrike">
+                <a:solidFill>
+                  <a:srgbClr val="ffffff"/>
+                </a:solidFill>
+                <a:latin typeface="Arial"/>
+              </a:rPr>
+              <a:t>e </a:t>
+            </a:r>
+            <a:r>
+              <a:rPr b="1" lang="en-US" sz="2400" spc="-1" strike="noStrike">
+                <a:solidFill>
+                  <a:srgbClr val="ffffff"/>
+                </a:solidFill>
+                <a:latin typeface="Arial"/>
+              </a:rPr>
+              <a:t>Server </a:t>
+            </a:r>
+            <a:r>
+              <a:rPr b="1" lang="en-US" sz="2400" spc="-1" strike="noStrike">
+                <a:solidFill>
+                  <a:srgbClr val="ffffff"/>
+                </a:solidFill>
+                <a:latin typeface="Arial"/>
+              </a:rPr>
+              <a:t>Set-Up</a:t>
             </a:r>
             <a:endParaRPr b="0" lang="de-DE" sz="2400" spc="-1" strike="noStrike">
               <a:solidFill>
@@ -44506,7 +45878,43 @@
                 </a:solidFill>
                 <a:latin typeface="Arial"/>
               </a:rPr>
-              <a:t>Pain Points</a:t>
+              <a:t>Pa</a:t>
+            </a:r>
+            <a:r>
+              <a:rPr b="1" lang="en-US" sz="2400" spc="-1" strike="noStrike">
+                <a:solidFill>
+                  <a:srgbClr val="ffffff"/>
+                </a:solidFill>
+                <a:latin typeface="Arial"/>
+              </a:rPr>
+              <a:t>in </a:t>
+            </a:r>
+            <a:r>
+              <a:rPr b="1" lang="en-US" sz="2400" spc="-1" strike="noStrike">
+                <a:solidFill>
+                  <a:srgbClr val="ffffff"/>
+                </a:solidFill>
+                <a:latin typeface="Arial"/>
+              </a:rPr>
+              <a:t>Po</a:t>
+            </a:r>
+            <a:r>
+              <a:rPr b="1" lang="en-US" sz="2400" spc="-1" strike="noStrike">
+                <a:solidFill>
+                  <a:srgbClr val="ffffff"/>
+                </a:solidFill>
+                <a:latin typeface="Arial"/>
+              </a:rPr>
+              <a:t>int</a:t>
+            </a:r>
+            <a:r>
+              <a:rPr b="1" lang="en-US" sz="2400" spc="-1" strike="noStrike">
+                <a:solidFill>
+                  <a:srgbClr val="ffffff"/>
+                </a:solidFill>
+                <a:latin typeface="Arial"/>
+              </a:rPr>
+              <a:t>s</a:t>
             </a:r>
             <a:endParaRPr b="0" lang="de-DE" sz="2400" spc="-1" strike="noStrike">
               <a:solidFill>

</xml_diff>